<commit_message>
1일 1 commit 재밌는 opencv 세계 - Contour
</commit_message>
<xml_diff>
--- a/경준_daily 공부 내용 정리/이미지분석/필기노트.pptx
+++ b/경준_daily 공부 내용 정리/이미지분석/필기노트.pptx
@@ -14,6 +14,14 @@
     <p:sldId id="262" r:id="rId8"/>
     <p:sldId id="263" r:id="rId9"/>
     <p:sldId id="264" r:id="rId10"/>
+    <p:sldId id="265" r:id="rId11"/>
+    <p:sldId id="266" r:id="rId12"/>
+    <p:sldId id="271" r:id="rId13"/>
+    <p:sldId id="267" r:id="rId14"/>
+    <p:sldId id="268" r:id="rId15"/>
+    <p:sldId id="269" r:id="rId16"/>
+    <p:sldId id="270" r:id="rId17"/>
+    <p:sldId id="272" r:id="rId18"/>
   </p:sldIdLst>
   <p:sldSz cx="12192000" cy="6858000"/>
   <p:notesSz cx="6858000" cy="9144000"/>
@@ -112,6 +120,11 @@
       </a:defRPr>
     </a:lvl9pPr>
   </p:defaultTextStyle>
+  <p:extLst>
+    <p:ext uri="{EFAFB233-063F-42B5-8137-9DF3F51BA10A}">
+      <p15:sldGuideLst xmlns:p15="http://schemas.microsoft.com/office/powerpoint/2012/main"/>
+    </p:ext>
+  </p:extLst>
 </p:presentation>
 </file>
 
@@ -262,7 +275,7 @@
           <a:p>
             <a:fld id="{0AE4C7A3-8800-4145-A0DC-8D3327D19E2C}" type="datetimeFigureOut">
               <a:rPr lang="ko-KR" altLang="en-US" smtClean="0"/>
-              <a:t>2019-10-30</a:t>
+              <a:t>2019-10-31</a:t>
             </a:fld>
             <a:endParaRPr lang="ko-KR" altLang="en-US"/>
           </a:p>
@@ -460,7 +473,7 @@
           <a:p>
             <a:fld id="{0AE4C7A3-8800-4145-A0DC-8D3327D19E2C}" type="datetimeFigureOut">
               <a:rPr lang="ko-KR" altLang="en-US" smtClean="0"/>
-              <a:t>2019-10-30</a:t>
+              <a:t>2019-10-31</a:t>
             </a:fld>
             <a:endParaRPr lang="ko-KR" altLang="en-US"/>
           </a:p>
@@ -668,7 +681,7 @@
           <a:p>
             <a:fld id="{0AE4C7A3-8800-4145-A0DC-8D3327D19E2C}" type="datetimeFigureOut">
               <a:rPr lang="ko-KR" altLang="en-US" smtClean="0"/>
-              <a:t>2019-10-30</a:t>
+              <a:t>2019-10-31</a:t>
             </a:fld>
             <a:endParaRPr lang="ko-KR" altLang="en-US"/>
           </a:p>
@@ -866,7 +879,7 @@
           <a:p>
             <a:fld id="{0AE4C7A3-8800-4145-A0DC-8D3327D19E2C}" type="datetimeFigureOut">
               <a:rPr lang="ko-KR" altLang="en-US" smtClean="0"/>
-              <a:t>2019-10-30</a:t>
+              <a:t>2019-10-31</a:t>
             </a:fld>
             <a:endParaRPr lang="ko-KR" altLang="en-US"/>
           </a:p>
@@ -1141,7 +1154,7 @@
           <a:p>
             <a:fld id="{0AE4C7A3-8800-4145-A0DC-8D3327D19E2C}" type="datetimeFigureOut">
               <a:rPr lang="ko-KR" altLang="en-US" smtClean="0"/>
-              <a:t>2019-10-30</a:t>
+              <a:t>2019-10-31</a:t>
             </a:fld>
             <a:endParaRPr lang="ko-KR" altLang="en-US"/>
           </a:p>
@@ -1406,7 +1419,7 @@
           <a:p>
             <a:fld id="{0AE4C7A3-8800-4145-A0DC-8D3327D19E2C}" type="datetimeFigureOut">
               <a:rPr lang="ko-KR" altLang="en-US" smtClean="0"/>
-              <a:t>2019-10-30</a:t>
+              <a:t>2019-10-31</a:t>
             </a:fld>
             <a:endParaRPr lang="ko-KR" altLang="en-US"/>
           </a:p>
@@ -1818,7 +1831,7 @@
           <a:p>
             <a:fld id="{0AE4C7A3-8800-4145-A0DC-8D3327D19E2C}" type="datetimeFigureOut">
               <a:rPr lang="ko-KR" altLang="en-US" smtClean="0"/>
-              <a:t>2019-10-30</a:t>
+              <a:t>2019-10-31</a:t>
             </a:fld>
             <a:endParaRPr lang="ko-KR" altLang="en-US"/>
           </a:p>
@@ -1959,7 +1972,7 @@
           <a:p>
             <a:fld id="{0AE4C7A3-8800-4145-A0DC-8D3327D19E2C}" type="datetimeFigureOut">
               <a:rPr lang="ko-KR" altLang="en-US" smtClean="0"/>
-              <a:t>2019-10-30</a:t>
+              <a:t>2019-10-31</a:t>
             </a:fld>
             <a:endParaRPr lang="ko-KR" altLang="en-US"/>
           </a:p>
@@ -2072,7 +2085,7 @@
           <a:p>
             <a:fld id="{0AE4C7A3-8800-4145-A0DC-8D3327D19E2C}" type="datetimeFigureOut">
               <a:rPr lang="ko-KR" altLang="en-US" smtClean="0"/>
-              <a:t>2019-10-30</a:t>
+              <a:t>2019-10-31</a:t>
             </a:fld>
             <a:endParaRPr lang="ko-KR" altLang="en-US"/>
           </a:p>
@@ -2383,7 +2396,7 @@
           <a:p>
             <a:fld id="{0AE4C7A3-8800-4145-A0DC-8D3327D19E2C}" type="datetimeFigureOut">
               <a:rPr lang="ko-KR" altLang="en-US" smtClean="0"/>
-              <a:t>2019-10-30</a:t>
+              <a:t>2019-10-31</a:t>
             </a:fld>
             <a:endParaRPr lang="ko-KR" altLang="en-US"/>
           </a:p>
@@ -2671,7 +2684,7 @@
           <a:p>
             <a:fld id="{0AE4C7A3-8800-4145-A0DC-8D3327D19E2C}" type="datetimeFigureOut">
               <a:rPr lang="ko-KR" altLang="en-US" smtClean="0"/>
-              <a:t>2019-10-30</a:t>
+              <a:t>2019-10-31</a:t>
             </a:fld>
             <a:endParaRPr lang="ko-KR" altLang="en-US"/>
           </a:p>
@@ -2912,7 +2925,7 @@
           <a:p>
             <a:fld id="{0AE4C7A3-8800-4145-A0DC-8D3327D19E2C}" type="datetimeFigureOut">
               <a:rPr lang="ko-KR" altLang="en-US" smtClean="0"/>
-              <a:t>2019-10-30</a:t>
+              <a:t>2019-10-31</a:t>
             </a:fld>
             <a:endParaRPr lang="ko-KR" altLang="en-US"/>
           </a:p>
@@ -3392,6 +3405,1142 @@
 </p:sld>
 </file>
 
+<file path=ppt/slides/slide10.xml><?xml version="1.0" encoding="utf-8"?>
+<p:sld xmlns:a="http://schemas.openxmlformats.org/drawingml/2006/main" xmlns:r="http://schemas.openxmlformats.org/officeDocument/2006/relationships" xmlns:p="http://schemas.openxmlformats.org/presentationml/2006/main">
+  <p:cSld>
+    <p:spTree>
+      <p:nvGrpSpPr>
+        <p:cNvPr id="1" name=""/>
+        <p:cNvGrpSpPr/>
+        <p:nvPr/>
+      </p:nvGrpSpPr>
+      <p:grpSpPr>
+        <a:xfrm>
+          <a:off x="0" y="0"/>
+          <a:ext cx="0" cy="0"/>
+          <a:chOff x="0" y="0"/>
+          <a:chExt cx="0" cy="0"/>
+        </a:xfrm>
+      </p:grpSpPr>
+      <p:sp>
+        <p:nvSpPr>
+          <p:cNvPr id="2" name="제목 1">
+            <a:extLst>
+              <a:ext uri="{FF2B5EF4-FFF2-40B4-BE49-F238E27FC236}">
+                <a16:creationId xmlns:a16="http://schemas.microsoft.com/office/drawing/2014/main" id="{184081E5-65F8-4B72-9BA8-DB2AFD68A931}"/>
+              </a:ext>
+            </a:extLst>
+          </p:cNvPr>
+          <p:cNvSpPr>
+            <a:spLocks noGrp="1"/>
+          </p:cNvSpPr>
+          <p:nvPr>
+            <p:ph type="title"/>
+          </p:nvPr>
+        </p:nvSpPr>
+        <p:spPr/>
+        <p:txBody>
+          <a:bodyPr/>
+          <a:lstStyle/>
+          <a:p>
+            <a:endParaRPr lang="ko-KR" altLang="en-US"/>
+          </a:p>
+        </p:txBody>
+      </p:sp>
+      <p:sp>
+        <p:nvSpPr>
+          <p:cNvPr id="3" name="내용 개체 틀 2">
+            <a:extLst>
+              <a:ext uri="{FF2B5EF4-FFF2-40B4-BE49-F238E27FC236}">
+                <a16:creationId xmlns:a16="http://schemas.microsoft.com/office/drawing/2014/main" id="{9BDD61C9-ECD9-4712-84FF-792EDAD64AFF}"/>
+              </a:ext>
+            </a:extLst>
+          </p:cNvPr>
+          <p:cNvSpPr>
+            <a:spLocks noGrp="1"/>
+          </p:cNvSpPr>
+          <p:nvPr>
+            <p:ph idx="1"/>
+          </p:nvPr>
+        </p:nvSpPr>
+        <p:spPr/>
+        <p:txBody>
+          <a:bodyPr/>
+          <a:lstStyle/>
+          <a:p>
+            <a:endParaRPr lang="ko-KR" altLang="en-US"/>
+          </a:p>
+        </p:txBody>
+      </p:sp>
+      <p:pic>
+        <p:nvPicPr>
+          <p:cNvPr id="4" name="그림 3">
+            <a:extLst>
+              <a:ext uri="{FF2B5EF4-FFF2-40B4-BE49-F238E27FC236}">
+                <a16:creationId xmlns:a16="http://schemas.microsoft.com/office/drawing/2014/main" id="{805C2002-875F-4788-90D3-B75FEFA063C7}"/>
+              </a:ext>
+            </a:extLst>
+          </p:cNvPr>
+          <p:cNvPicPr>
+            <a:picLocks noChangeAspect="1"/>
+          </p:cNvPicPr>
+          <p:nvPr/>
+        </p:nvPicPr>
+        <p:blipFill>
+          <a:blip r:embed="rId2"/>
+          <a:stretch>
+            <a:fillRect/>
+          </a:stretch>
+        </p:blipFill>
+        <p:spPr>
+          <a:xfrm>
+            <a:off x="350021" y="365124"/>
+            <a:ext cx="7883205" cy="5666707"/>
+          </a:xfrm>
+          <a:prstGeom prst="rect">
+            <a:avLst/>
+          </a:prstGeom>
+        </p:spPr>
+      </p:pic>
+      <p:sp>
+        <p:nvSpPr>
+          <p:cNvPr id="5" name="타원 4">
+            <a:extLst>
+              <a:ext uri="{FF2B5EF4-FFF2-40B4-BE49-F238E27FC236}">
+                <a16:creationId xmlns:a16="http://schemas.microsoft.com/office/drawing/2014/main" id="{0911D1D4-3ED8-4463-9934-EF37AA46ACB3}"/>
+              </a:ext>
+            </a:extLst>
+          </p:cNvPr>
+          <p:cNvSpPr/>
+          <p:nvPr/>
+        </p:nvSpPr>
+        <p:spPr>
+          <a:xfrm>
+            <a:off x="2057400" y="2284077"/>
+            <a:ext cx="914400" cy="914400"/>
+          </a:xfrm>
+          <a:prstGeom prst="ellipse">
+            <a:avLst/>
+          </a:prstGeom>
+        </p:spPr>
+        <p:style>
+          <a:lnRef idx="2">
+            <a:schemeClr val="accent1">
+              <a:shade val="50000"/>
+            </a:schemeClr>
+          </a:lnRef>
+          <a:fillRef idx="1">
+            <a:schemeClr val="accent1"/>
+          </a:fillRef>
+          <a:effectRef idx="0">
+            <a:schemeClr val="accent1"/>
+          </a:effectRef>
+          <a:fontRef idx="minor">
+            <a:schemeClr val="lt1"/>
+          </a:fontRef>
+        </p:style>
+        <p:txBody>
+          <a:bodyPr rtlCol="0" anchor="ctr"/>
+          <a:lstStyle/>
+          <a:p>
+            <a:pPr algn="ctr"/>
+            <a:endParaRPr lang="ko-KR" altLang="en-US"/>
+          </a:p>
+        </p:txBody>
+      </p:sp>
+      <p:sp>
+        <p:nvSpPr>
+          <p:cNvPr id="6" name="타원 5">
+            <a:extLst>
+              <a:ext uri="{FF2B5EF4-FFF2-40B4-BE49-F238E27FC236}">
+                <a16:creationId xmlns:a16="http://schemas.microsoft.com/office/drawing/2014/main" id="{023DF1CD-C81F-4E59-88C2-A305B85CE394}"/>
+              </a:ext>
+            </a:extLst>
+          </p:cNvPr>
+          <p:cNvSpPr/>
+          <p:nvPr/>
+        </p:nvSpPr>
+        <p:spPr>
+          <a:xfrm>
+            <a:off x="7038474" y="3544094"/>
+            <a:ext cx="914400" cy="914400"/>
+          </a:xfrm>
+          <a:prstGeom prst="ellipse">
+            <a:avLst/>
+          </a:prstGeom>
+        </p:spPr>
+        <p:style>
+          <a:lnRef idx="2">
+            <a:schemeClr val="accent1">
+              <a:shade val="50000"/>
+            </a:schemeClr>
+          </a:lnRef>
+          <a:fillRef idx="1">
+            <a:schemeClr val="accent1"/>
+          </a:fillRef>
+          <a:effectRef idx="0">
+            <a:schemeClr val="accent1"/>
+          </a:effectRef>
+          <a:fontRef idx="minor">
+            <a:schemeClr val="lt1"/>
+          </a:fontRef>
+        </p:style>
+        <p:txBody>
+          <a:bodyPr rtlCol="0" anchor="ctr"/>
+          <a:lstStyle/>
+          <a:p>
+            <a:pPr algn="ctr"/>
+            <a:endParaRPr lang="ko-KR" altLang="en-US"/>
+          </a:p>
+        </p:txBody>
+      </p:sp>
+      <p:sp>
+        <p:nvSpPr>
+          <p:cNvPr id="8" name="TextBox 7">
+            <a:extLst>
+              <a:ext uri="{FF2B5EF4-FFF2-40B4-BE49-F238E27FC236}">
+                <a16:creationId xmlns:a16="http://schemas.microsoft.com/office/drawing/2014/main" id="{FA1D0841-2326-47D6-B439-7251D9A1B3BF}"/>
+              </a:ext>
+            </a:extLst>
+          </p:cNvPr>
+          <p:cNvSpPr txBox="1"/>
+          <p:nvPr/>
+        </p:nvSpPr>
+        <p:spPr>
+          <a:xfrm>
+            <a:off x="8233226" y="2470484"/>
+            <a:ext cx="3120574" cy="923330"/>
+          </a:xfrm>
+          <a:prstGeom prst="rect">
+            <a:avLst/>
+          </a:prstGeom>
+          <a:noFill/>
+        </p:spPr>
+        <p:txBody>
+          <a:bodyPr wrap="square" rtlCol="0">
+            <a:spAutoFit/>
+          </a:bodyPr>
+          <a:lstStyle/>
+          <a:p>
+            <a:r>
+              <a:rPr lang="en-US" altLang="ko-KR"/>
+              <a:t>descriptor </a:t>
+            </a:r>
+            <a:r>
+              <a:rPr lang="ko-KR" altLang="en-US"/>
+              <a:t>의 값이 유사한 </a:t>
+            </a:r>
+            <a:endParaRPr lang="en-US" altLang="ko-KR"/>
+          </a:p>
+          <a:p>
+            <a:endParaRPr lang="en-US" altLang="ko-KR"/>
+          </a:p>
+          <a:p>
+            <a:endParaRPr lang="ko-KR" altLang="en-US"/>
+          </a:p>
+        </p:txBody>
+      </p:sp>
+    </p:spTree>
+    <p:extLst>
+      <p:ext uri="{BB962C8B-B14F-4D97-AF65-F5344CB8AC3E}">
+        <p14:creationId xmlns:p14="http://schemas.microsoft.com/office/powerpoint/2010/main" val="3166990365"/>
+      </p:ext>
+    </p:extLst>
+  </p:cSld>
+  <p:clrMapOvr>
+    <a:masterClrMapping/>
+  </p:clrMapOvr>
+</p:sld>
+</file>
+
+<file path=ppt/slides/slide11.xml><?xml version="1.0" encoding="utf-8"?>
+<p:sld xmlns:a="http://schemas.openxmlformats.org/drawingml/2006/main" xmlns:r="http://schemas.openxmlformats.org/officeDocument/2006/relationships" xmlns:p="http://schemas.openxmlformats.org/presentationml/2006/main">
+  <p:cSld>
+    <p:spTree>
+      <p:nvGrpSpPr>
+        <p:cNvPr id="1" name=""/>
+        <p:cNvGrpSpPr/>
+        <p:nvPr/>
+      </p:nvGrpSpPr>
+      <p:grpSpPr>
+        <a:xfrm>
+          <a:off x="0" y="0"/>
+          <a:ext cx="0" cy="0"/>
+          <a:chOff x="0" y="0"/>
+          <a:chExt cx="0" cy="0"/>
+        </a:xfrm>
+      </p:grpSpPr>
+      <p:sp>
+        <p:nvSpPr>
+          <p:cNvPr id="4" name="TextBox 3">
+            <a:extLst>
+              <a:ext uri="{FF2B5EF4-FFF2-40B4-BE49-F238E27FC236}">
+                <a16:creationId xmlns:a16="http://schemas.microsoft.com/office/drawing/2014/main" id="{7E9A3552-C0F3-4B1D-8639-3CD5122B30BB}"/>
+              </a:ext>
+            </a:extLst>
+          </p:cNvPr>
+          <p:cNvSpPr txBox="1"/>
+          <p:nvPr/>
+        </p:nvSpPr>
+        <p:spPr>
+          <a:xfrm>
+            <a:off x="385011" y="1122947"/>
+            <a:ext cx="9176084" cy="3416320"/>
+          </a:xfrm>
+          <a:prstGeom prst="rect">
+            <a:avLst/>
+          </a:prstGeom>
+          <a:noFill/>
+        </p:spPr>
+        <p:txBody>
+          <a:bodyPr wrap="square" rtlCol="0">
+            <a:spAutoFit/>
+          </a:bodyPr>
+          <a:lstStyle/>
+          <a:p>
+            <a:r>
+              <a:rPr lang="en-US" altLang="ko-KR"/>
+              <a:t>corner -&gt; Edge</a:t>
+            </a:r>
+            <a:r>
+              <a:rPr lang="ko-KR" altLang="en-US"/>
+              <a:t>에 취약함</a:t>
+            </a:r>
+            <a:endParaRPr lang="en-US" altLang="ko-KR"/>
+          </a:p>
+          <a:p>
+            <a:endParaRPr lang="en-US" altLang="ko-KR"/>
+          </a:p>
+          <a:p>
+            <a:r>
+              <a:rPr lang="en-US" altLang="ko-KR"/>
+              <a:t>corne</a:t>
+            </a:r>
+            <a:r>
+              <a:rPr lang="ko-KR" altLang="en-US"/>
+              <a:t>는 사진을 확대하기 전에 산 꼭대기</a:t>
+            </a:r>
+            <a:endParaRPr lang="en-US" altLang="ko-KR"/>
+          </a:p>
+          <a:p>
+            <a:r>
+              <a:rPr lang="en-US" altLang="ko-KR"/>
+              <a:t>Edge –</a:t>
+            </a:r>
+            <a:r>
+              <a:rPr lang="ko-KR" altLang="en-US"/>
+              <a:t>사진을 확대한 나온 </a:t>
+            </a:r>
+            <a:endParaRPr lang="en-US" altLang="ko-KR"/>
+          </a:p>
+          <a:p>
+            <a:endParaRPr lang="en-US" altLang="ko-KR"/>
+          </a:p>
+          <a:p>
+            <a:endParaRPr lang="en-US" altLang="ko-KR"/>
+          </a:p>
+          <a:p>
+            <a:r>
+              <a:rPr lang="ko-KR" altLang="en-US"/>
+              <a:t>실제로는 </a:t>
+            </a:r>
+            <a:r>
+              <a:rPr lang="en-US" altLang="ko-KR"/>
+              <a:t>scale</a:t>
+            </a:r>
+            <a:r>
+              <a:rPr lang="ko-KR" altLang="en-US"/>
+              <a:t>과 상관없이 </a:t>
+            </a:r>
+            <a:r>
+              <a:rPr lang="en-US" altLang="ko-KR"/>
+              <a:t>descriptor</a:t>
+            </a:r>
+            <a:r>
+              <a:rPr lang="ko-KR" altLang="en-US"/>
+              <a:t>를 </a:t>
+            </a:r>
+            <a:endParaRPr lang="en-US" altLang="ko-KR"/>
+          </a:p>
+          <a:p>
+            <a:endParaRPr lang="en-US" altLang="ko-KR"/>
+          </a:p>
+          <a:p>
+            <a:r>
+              <a:rPr lang="ko-KR" altLang="en-US"/>
+              <a:t>먼저 변화가 없는 부분을 먼저 찾아내고</a:t>
+            </a:r>
+            <a:r>
+              <a:rPr lang="en-US" altLang="ko-KR"/>
+              <a:t>, featur</a:t>
+            </a:r>
+            <a:r>
+              <a:rPr lang="ko-KR" altLang="en-US"/>
+              <a:t>의 </a:t>
+            </a:r>
+            <a:r>
+              <a:rPr lang="en-US" altLang="ko-KR"/>
+              <a:t>description</a:t>
+            </a:r>
+            <a:r>
+              <a:rPr lang="ko-KR" altLang="en-US"/>
+              <a:t>을 찾아내자</a:t>
+            </a:r>
+            <a:endParaRPr lang="en-US" altLang="ko-KR"/>
+          </a:p>
+          <a:p>
+            <a:r>
+              <a:rPr lang="en-US" altLang="ko-KR"/>
+              <a:t>scale</a:t>
+            </a:r>
+            <a:r>
+              <a:rPr lang="ko-KR" altLang="en-US"/>
+              <a:t>의 변화를 </a:t>
+            </a:r>
+            <a:endParaRPr lang="en-US" altLang="ko-KR"/>
+          </a:p>
+          <a:p>
+            <a:endParaRPr lang="en-US" altLang="ko-KR"/>
+          </a:p>
+          <a:p>
+            <a:endParaRPr lang="ko-KR" altLang="en-US"/>
+          </a:p>
+        </p:txBody>
+      </p:sp>
+    </p:spTree>
+    <p:extLst>
+      <p:ext uri="{BB962C8B-B14F-4D97-AF65-F5344CB8AC3E}">
+        <p14:creationId xmlns:p14="http://schemas.microsoft.com/office/powerpoint/2010/main" val="536149542"/>
+      </p:ext>
+    </p:extLst>
+  </p:cSld>
+  <p:clrMapOvr>
+    <a:masterClrMapping/>
+  </p:clrMapOvr>
+</p:sld>
+</file>
+
+<file path=ppt/slides/slide12.xml><?xml version="1.0" encoding="utf-8"?>
+<p:sld xmlns:a="http://schemas.openxmlformats.org/drawingml/2006/main" xmlns:r="http://schemas.openxmlformats.org/officeDocument/2006/relationships" xmlns:p="http://schemas.openxmlformats.org/presentationml/2006/main">
+  <p:cSld>
+    <p:spTree>
+      <p:nvGrpSpPr>
+        <p:cNvPr id="1" name=""/>
+        <p:cNvGrpSpPr/>
+        <p:nvPr/>
+      </p:nvGrpSpPr>
+      <p:grpSpPr>
+        <a:xfrm>
+          <a:off x="0" y="0"/>
+          <a:ext cx="0" cy="0"/>
+          <a:chOff x="0" y="0"/>
+          <a:chExt cx="0" cy="0"/>
+        </a:xfrm>
+      </p:grpSpPr>
+      <p:sp>
+        <p:nvSpPr>
+          <p:cNvPr id="2" name="제목 1">
+            <a:extLst>
+              <a:ext uri="{FF2B5EF4-FFF2-40B4-BE49-F238E27FC236}">
+                <a16:creationId xmlns:a16="http://schemas.microsoft.com/office/drawing/2014/main" id="{F8B90BD4-F575-403E-BFA7-548024D51B1E}"/>
+              </a:ext>
+            </a:extLst>
+          </p:cNvPr>
+          <p:cNvSpPr>
+            <a:spLocks noGrp="1"/>
+          </p:cNvSpPr>
+          <p:nvPr>
+            <p:ph type="title"/>
+          </p:nvPr>
+        </p:nvSpPr>
+        <p:spPr/>
+        <p:txBody>
+          <a:bodyPr/>
+          <a:lstStyle/>
+          <a:p>
+            <a:endParaRPr lang="ko-KR" altLang="en-US"/>
+          </a:p>
+        </p:txBody>
+      </p:sp>
+      <p:sp>
+        <p:nvSpPr>
+          <p:cNvPr id="3" name="내용 개체 틀 2">
+            <a:extLst>
+              <a:ext uri="{FF2B5EF4-FFF2-40B4-BE49-F238E27FC236}">
+                <a16:creationId xmlns:a16="http://schemas.microsoft.com/office/drawing/2014/main" id="{08EC4B1E-7993-422F-AE56-516023D16238}"/>
+              </a:ext>
+            </a:extLst>
+          </p:cNvPr>
+          <p:cNvSpPr>
+            <a:spLocks noGrp="1"/>
+          </p:cNvSpPr>
+          <p:nvPr>
+            <p:ph idx="1"/>
+          </p:nvPr>
+        </p:nvSpPr>
+        <p:spPr/>
+        <p:txBody>
+          <a:bodyPr/>
+          <a:lstStyle/>
+          <a:p>
+            <a:endParaRPr lang="ko-KR" altLang="en-US"/>
+          </a:p>
+        </p:txBody>
+      </p:sp>
+      <p:pic>
+        <p:nvPicPr>
+          <p:cNvPr id="4" name="그림 3">
+            <a:extLst>
+              <a:ext uri="{FF2B5EF4-FFF2-40B4-BE49-F238E27FC236}">
+                <a16:creationId xmlns:a16="http://schemas.microsoft.com/office/drawing/2014/main" id="{5BE7C345-9F84-4186-9861-31429142F362}"/>
+              </a:ext>
+            </a:extLst>
+          </p:cNvPr>
+          <p:cNvPicPr>
+            <a:picLocks noChangeAspect="1"/>
+          </p:cNvPicPr>
+          <p:nvPr/>
+        </p:nvPicPr>
+        <p:blipFill>
+          <a:blip r:embed="rId2"/>
+          <a:stretch>
+            <a:fillRect/>
+          </a:stretch>
+        </p:blipFill>
+        <p:spPr>
+          <a:xfrm>
+            <a:off x="933002" y="514097"/>
+            <a:ext cx="10325995" cy="5829805"/>
+          </a:xfrm>
+          <a:prstGeom prst="rect">
+            <a:avLst/>
+          </a:prstGeom>
+        </p:spPr>
+      </p:pic>
+      <p:sp>
+        <p:nvSpPr>
+          <p:cNvPr id="5" name="TextBox 4">
+            <a:extLst>
+              <a:ext uri="{FF2B5EF4-FFF2-40B4-BE49-F238E27FC236}">
+                <a16:creationId xmlns:a16="http://schemas.microsoft.com/office/drawing/2014/main" id="{BF9B7CB0-81CA-4A4D-823A-51CFCEFD1C35}"/>
+              </a:ext>
+            </a:extLst>
+          </p:cNvPr>
+          <p:cNvSpPr txBox="1"/>
+          <p:nvPr/>
+        </p:nvSpPr>
+        <p:spPr>
+          <a:xfrm>
+            <a:off x="646420" y="5290936"/>
+            <a:ext cx="4952275" cy="646331"/>
+          </a:xfrm>
+          <a:prstGeom prst="rect">
+            <a:avLst/>
+          </a:prstGeom>
+          <a:noFill/>
+        </p:spPr>
+        <p:txBody>
+          <a:bodyPr wrap="square" rtlCol="0">
+            <a:spAutoFit/>
+          </a:bodyPr>
+          <a:lstStyle/>
+          <a:p>
+            <a:r>
+              <a:rPr lang="ko-KR" altLang="en-US"/>
+              <a:t>가우시안 필터를 사용하면 할 수록 위로 올라갈수록 </a:t>
+            </a:r>
+            <a:r>
+              <a:rPr lang="en-US" altLang="ko-KR"/>
+              <a:t>scale</a:t>
+            </a:r>
+            <a:r>
+              <a:rPr lang="ko-KR" altLang="en-US"/>
+              <a:t>은 커지고 흐려짐</a:t>
+            </a:r>
+          </a:p>
+        </p:txBody>
+      </p:sp>
+    </p:spTree>
+    <p:extLst>
+      <p:ext uri="{BB962C8B-B14F-4D97-AF65-F5344CB8AC3E}">
+        <p14:creationId xmlns:p14="http://schemas.microsoft.com/office/powerpoint/2010/main" val="1653247159"/>
+      </p:ext>
+    </p:extLst>
+  </p:cSld>
+  <p:clrMapOvr>
+    <a:masterClrMapping/>
+  </p:clrMapOvr>
+</p:sld>
+</file>
+
+<file path=ppt/slides/slide13.xml><?xml version="1.0" encoding="utf-8"?>
+<p:sld xmlns:a="http://schemas.openxmlformats.org/drawingml/2006/main" xmlns:r="http://schemas.openxmlformats.org/officeDocument/2006/relationships" xmlns:p="http://schemas.openxmlformats.org/presentationml/2006/main">
+  <p:cSld>
+    <p:spTree>
+      <p:nvGrpSpPr>
+        <p:cNvPr id="1" name=""/>
+        <p:cNvGrpSpPr/>
+        <p:nvPr/>
+      </p:nvGrpSpPr>
+      <p:grpSpPr>
+        <a:xfrm>
+          <a:off x="0" y="0"/>
+          <a:ext cx="0" cy="0"/>
+          <a:chOff x="0" y="0"/>
+          <a:chExt cx="0" cy="0"/>
+        </a:xfrm>
+      </p:grpSpPr>
+      <p:sp>
+        <p:nvSpPr>
+          <p:cNvPr id="2" name="제목 1">
+            <a:extLst>
+              <a:ext uri="{FF2B5EF4-FFF2-40B4-BE49-F238E27FC236}">
+                <a16:creationId xmlns:a16="http://schemas.microsoft.com/office/drawing/2014/main" id="{2A31A9FC-564C-4E01-92E0-9F9B8A6A312F}"/>
+              </a:ext>
+            </a:extLst>
+          </p:cNvPr>
+          <p:cNvSpPr>
+            <a:spLocks noGrp="1"/>
+          </p:cNvSpPr>
+          <p:nvPr>
+            <p:ph type="title"/>
+          </p:nvPr>
+        </p:nvSpPr>
+        <p:spPr/>
+        <p:txBody>
+          <a:bodyPr/>
+          <a:lstStyle/>
+          <a:p>
+            <a:endParaRPr lang="ko-KR" altLang="en-US"/>
+          </a:p>
+        </p:txBody>
+      </p:sp>
+      <p:sp>
+        <p:nvSpPr>
+          <p:cNvPr id="3" name="내용 개체 틀 2">
+            <a:extLst>
+              <a:ext uri="{FF2B5EF4-FFF2-40B4-BE49-F238E27FC236}">
+                <a16:creationId xmlns:a16="http://schemas.microsoft.com/office/drawing/2014/main" id="{DC8C8CA4-17C6-4313-9023-B763F93AFAC3}"/>
+              </a:ext>
+            </a:extLst>
+          </p:cNvPr>
+          <p:cNvSpPr>
+            <a:spLocks noGrp="1"/>
+          </p:cNvSpPr>
+          <p:nvPr>
+            <p:ph idx="1"/>
+          </p:nvPr>
+        </p:nvSpPr>
+        <p:spPr/>
+        <p:txBody>
+          <a:bodyPr/>
+          <a:lstStyle/>
+          <a:p>
+            <a:endParaRPr lang="ko-KR" altLang="en-US"/>
+          </a:p>
+        </p:txBody>
+      </p:sp>
+      <p:sp>
+        <p:nvSpPr>
+          <p:cNvPr id="4" name="TextBox 3">
+            <a:extLst>
+              <a:ext uri="{FF2B5EF4-FFF2-40B4-BE49-F238E27FC236}">
+                <a16:creationId xmlns:a16="http://schemas.microsoft.com/office/drawing/2014/main" id="{9F63DEC3-7901-4F81-A5F0-F342F5BA5D22}"/>
+              </a:ext>
+            </a:extLst>
+          </p:cNvPr>
+          <p:cNvSpPr txBox="1"/>
+          <p:nvPr/>
+        </p:nvSpPr>
+        <p:spPr>
+          <a:xfrm>
+            <a:off x="838200" y="3721768"/>
+            <a:ext cx="8803105" cy="1754326"/>
+          </a:xfrm>
+          <a:prstGeom prst="rect">
+            <a:avLst/>
+          </a:prstGeom>
+          <a:noFill/>
+        </p:spPr>
+        <p:txBody>
+          <a:bodyPr wrap="square" rtlCol="0">
+            <a:spAutoFit/>
+          </a:bodyPr>
+          <a:lstStyle/>
+          <a:p>
+            <a:r>
+              <a:rPr lang="en-US" altLang="ko-KR"/>
+              <a:t>scale</a:t>
+            </a:r>
+            <a:r>
+              <a:rPr lang="ko-KR" altLang="en-US"/>
+              <a:t>에 상관없이 일관된 </a:t>
+            </a:r>
+            <a:r>
+              <a:rPr lang="en-US" altLang="ko-KR"/>
+              <a:t>descriptor</a:t>
+            </a:r>
+            <a:r>
+              <a:rPr lang="ko-KR" altLang="en-US"/>
+              <a:t>를 뽑아낼 수 있는 지점</a:t>
+            </a:r>
+            <a:endParaRPr lang="en-US" altLang="ko-KR"/>
+          </a:p>
+          <a:p>
+            <a:endParaRPr lang="en-US" altLang="ko-KR"/>
+          </a:p>
+          <a:p>
+            <a:pPr marL="342900" indent="-342900">
+              <a:buAutoNum type="arabicParenR"/>
+            </a:pPr>
+            <a:r>
+              <a:rPr lang="ko-KR" altLang="en-US"/>
+              <a:t>차이가 크지 않은점 삭제</a:t>
+            </a:r>
+            <a:endParaRPr lang="en-US" altLang="ko-KR"/>
+          </a:p>
+          <a:p>
+            <a:pPr marL="342900" indent="-342900">
+              <a:buAutoNum type="arabicParenR"/>
+            </a:pPr>
+            <a:r>
+              <a:rPr lang="en-US" altLang="ko-KR"/>
+              <a:t>Edge </a:t>
+            </a:r>
+            <a:r>
+              <a:rPr lang="ko-KR" altLang="en-US"/>
+              <a:t>포인트 삭제</a:t>
+            </a:r>
+            <a:endParaRPr lang="en-US" altLang="ko-KR"/>
+          </a:p>
+          <a:p>
+            <a:pPr marL="342900" indent="-342900">
+              <a:buAutoNum type="arabicParenR"/>
+            </a:pPr>
+            <a:endParaRPr lang="en-US" altLang="ko-KR"/>
+          </a:p>
+          <a:p>
+            <a:endParaRPr lang="ko-KR" altLang="en-US"/>
+          </a:p>
+        </p:txBody>
+      </p:sp>
+    </p:spTree>
+    <p:extLst>
+      <p:ext uri="{BB962C8B-B14F-4D97-AF65-F5344CB8AC3E}">
+        <p14:creationId xmlns:p14="http://schemas.microsoft.com/office/powerpoint/2010/main" val="249691824"/>
+      </p:ext>
+    </p:extLst>
+  </p:cSld>
+  <p:clrMapOvr>
+    <a:masterClrMapping/>
+  </p:clrMapOvr>
+</p:sld>
+</file>
+
+<file path=ppt/slides/slide14.xml><?xml version="1.0" encoding="utf-8"?>
+<p:sld xmlns:a="http://schemas.openxmlformats.org/drawingml/2006/main" xmlns:r="http://schemas.openxmlformats.org/officeDocument/2006/relationships" xmlns:p="http://schemas.openxmlformats.org/presentationml/2006/main">
+  <p:cSld>
+    <p:spTree>
+      <p:nvGrpSpPr>
+        <p:cNvPr id="1" name=""/>
+        <p:cNvGrpSpPr/>
+        <p:nvPr/>
+      </p:nvGrpSpPr>
+      <p:grpSpPr>
+        <a:xfrm>
+          <a:off x="0" y="0"/>
+          <a:ext cx="0" cy="0"/>
+          <a:chOff x="0" y="0"/>
+          <a:chExt cx="0" cy="0"/>
+        </a:xfrm>
+      </p:grpSpPr>
+      <p:sp>
+        <p:nvSpPr>
+          <p:cNvPr id="2" name="제목 1">
+            <a:extLst>
+              <a:ext uri="{FF2B5EF4-FFF2-40B4-BE49-F238E27FC236}">
+                <a16:creationId xmlns:a16="http://schemas.microsoft.com/office/drawing/2014/main" id="{B26412A1-76F2-4625-A2FF-96429DA3F994}"/>
+              </a:ext>
+            </a:extLst>
+          </p:cNvPr>
+          <p:cNvSpPr>
+            <a:spLocks noGrp="1"/>
+          </p:cNvSpPr>
+          <p:nvPr>
+            <p:ph type="title"/>
+          </p:nvPr>
+        </p:nvSpPr>
+        <p:spPr/>
+        <p:txBody>
+          <a:bodyPr/>
+          <a:lstStyle/>
+          <a:p>
+            <a:endParaRPr lang="ko-KR" altLang="en-US"/>
+          </a:p>
+        </p:txBody>
+      </p:sp>
+      <p:sp>
+        <p:nvSpPr>
+          <p:cNvPr id="3" name="내용 개체 틀 2">
+            <a:extLst>
+              <a:ext uri="{FF2B5EF4-FFF2-40B4-BE49-F238E27FC236}">
+                <a16:creationId xmlns:a16="http://schemas.microsoft.com/office/drawing/2014/main" id="{601668CD-FE32-423E-A082-6278F4FEA874}"/>
+              </a:ext>
+            </a:extLst>
+          </p:cNvPr>
+          <p:cNvSpPr>
+            <a:spLocks noGrp="1"/>
+          </p:cNvSpPr>
+          <p:nvPr>
+            <p:ph idx="1"/>
+          </p:nvPr>
+        </p:nvSpPr>
+        <p:spPr/>
+        <p:txBody>
+          <a:bodyPr/>
+          <a:lstStyle/>
+          <a:p>
+            <a:r>
+              <a:rPr lang="en-US" altLang="ko-KR"/>
+              <a:t>kp1, des1 : keypoint ,descriptor</a:t>
+            </a:r>
+          </a:p>
+          <a:p>
+            <a:endParaRPr lang="en-US" altLang="ko-KR"/>
+          </a:p>
+          <a:p>
+            <a:endParaRPr lang="ko-KR" altLang="en-US"/>
+          </a:p>
+        </p:txBody>
+      </p:sp>
+    </p:spTree>
+    <p:extLst>
+      <p:ext uri="{BB962C8B-B14F-4D97-AF65-F5344CB8AC3E}">
+        <p14:creationId xmlns:p14="http://schemas.microsoft.com/office/powerpoint/2010/main" val="4072107288"/>
+      </p:ext>
+    </p:extLst>
+  </p:cSld>
+  <p:clrMapOvr>
+    <a:masterClrMapping/>
+  </p:clrMapOvr>
+</p:sld>
+</file>
+
+<file path=ppt/slides/slide15.xml><?xml version="1.0" encoding="utf-8"?>
+<p:sld xmlns:a="http://schemas.openxmlformats.org/drawingml/2006/main" xmlns:r="http://schemas.openxmlformats.org/officeDocument/2006/relationships" xmlns:p="http://schemas.openxmlformats.org/presentationml/2006/main">
+  <p:cSld>
+    <p:spTree>
+      <p:nvGrpSpPr>
+        <p:cNvPr id="1" name=""/>
+        <p:cNvGrpSpPr/>
+        <p:nvPr/>
+      </p:nvGrpSpPr>
+      <p:grpSpPr>
+        <a:xfrm>
+          <a:off x="0" y="0"/>
+          <a:ext cx="0" cy="0"/>
+          <a:chOff x="0" y="0"/>
+          <a:chExt cx="0" cy="0"/>
+        </a:xfrm>
+      </p:grpSpPr>
+      <p:pic>
+        <p:nvPicPr>
+          <p:cNvPr id="4" name="그림 3">
+            <a:extLst>
+              <a:ext uri="{FF2B5EF4-FFF2-40B4-BE49-F238E27FC236}">
+                <a16:creationId xmlns:a16="http://schemas.microsoft.com/office/drawing/2014/main" id="{15421012-7F8E-471D-AD33-73053E4F87D6}"/>
+              </a:ext>
+            </a:extLst>
+          </p:cNvPr>
+          <p:cNvPicPr>
+            <a:picLocks noChangeAspect="1"/>
+          </p:cNvPicPr>
+          <p:nvPr/>
+        </p:nvPicPr>
+        <p:blipFill>
+          <a:blip r:embed="rId2"/>
+          <a:stretch>
+            <a:fillRect/>
+          </a:stretch>
+        </p:blipFill>
+        <p:spPr>
+          <a:xfrm>
+            <a:off x="1307453" y="73415"/>
+            <a:ext cx="6360673" cy="6419460"/>
+          </a:xfrm>
+          <a:prstGeom prst="rect">
+            <a:avLst/>
+          </a:prstGeom>
+        </p:spPr>
+      </p:pic>
+    </p:spTree>
+    <p:extLst>
+      <p:ext uri="{BB962C8B-B14F-4D97-AF65-F5344CB8AC3E}">
+        <p14:creationId xmlns:p14="http://schemas.microsoft.com/office/powerpoint/2010/main" val="2536522951"/>
+      </p:ext>
+    </p:extLst>
+  </p:cSld>
+  <p:clrMapOvr>
+    <a:masterClrMapping/>
+  </p:clrMapOvr>
+</p:sld>
+</file>
+
+<file path=ppt/slides/slide16.xml><?xml version="1.0" encoding="utf-8"?>
+<p:sld xmlns:a="http://schemas.openxmlformats.org/drawingml/2006/main" xmlns:r="http://schemas.openxmlformats.org/officeDocument/2006/relationships" xmlns:p="http://schemas.openxmlformats.org/presentationml/2006/main">
+  <p:cSld>
+    <p:spTree>
+      <p:nvGrpSpPr>
+        <p:cNvPr id="1" name=""/>
+        <p:cNvGrpSpPr/>
+        <p:nvPr/>
+      </p:nvGrpSpPr>
+      <p:grpSpPr>
+        <a:xfrm>
+          <a:off x="0" y="0"/>
+          <a:ext cx="0" cy="0"/>
+          <a:chOff x="0" y="0"/>
+          <a:chExt cx="0" cy="0"/>
+        </a:xfrm>
+      </p:grpSpPr>
+      <p:sp>
+        <p:nvSpPr>
+          <p:cNvPr id="2" name="제목 1">
+            <a:extLst>
+              <a:ext uri="{FF2B5EF4-FFF2-40B4-BE49-F238E27FC236}">
+                <a16:creationId xmlns:a16="http://schemas.microsoft.com/office/drawing/2014/main" id="{B4568093-EFCD-4EB8-B734-D9FB8EA4CD80}"/>
+              </a:ext>
+            </a:extLst>
+          </p:cNvPr>
+          <p:cNvSpPr>
+            <a:spLocks noGrp="1"/>
+          </p:cNvSpPr>
+          <p:nvPr>
+            <p:ph type="title"/>
+          </p:nvPr>
+        </p:nvSpPr>
+        <p:spPr/>
+        <p:txBody>
+          <a:bodyPr/>
+          <a:lstStyle/>
+          <a:p>
+            <a:endParaRPr lang="ko-KR" altLang="en-US"/>
+          </a:p>
+        </p:txBody>
+      </p:sp>
+      <p:sp>
+        <p:nvSpPr>
+          <p:cNvPr id="3" name="내용 개체 틀 2">
+            <a:extLst>
+              <a:ext uri="{FF2B5EF4-FFF2-40B4-BE49-F238E27FC236}">
+                <a16:creationId xmlns:a16="http://schemas.microsoft.com/office/drawing/2014/main" id="{E15F6E83-D069-4824-91D2-92D64139897D}"/>
+              </a:ext>
+            </a:extLst>
+          </p:cNvPr>
+          <p:cNvSpPr>
+            <a:spLocks noGrp="1"/>
+          </p:cNvSpPr>
+          <p:nvPr>
+            <p:ph idx="1"/>
+          </p:nvPr>
+        </p:nvSpPr>
+        <p:spPr/>
+        <p:txBody>
+          <a:bodyPr/>
+          <a:lstStyle/>
+          <a:p>
+            <a:r>
+              <a:rPr lang="en-US" altLang="ko-KR"/>
+              <a:t>0.01*cv2.arcLength(cnt,True) </a:t>
+            </a:r>
+            <a:r>
+              <a:rPr lang="ko-KR" altLang="en-US"/>
+              <a:t>를 </a:t>
+            </a:r>
+            <a:r>
+              <a:rPr lang="en-US" altLang="ko-KR"/>
+              <a:t>accuracy</a:t>
+            </a:r>
+            <a:r>
+              <a:rPr lang="ko-KR" altLang="en-US"/>
+              <a:t>로 넣었을 경우</a:t>
+            </a:r>
+            <a:endParaRPr lang="en-US" altLang="ko-KR"/>
+          </a:p>
+          <a:p>
+            <a:endParaRPr lang="en-US" altLang="ko-KR"/>
+          </a:p>
+          <a:p>
+            <a:endParaRPr lang="en-US" altLang="ko-KR"/>
+          </a:p>
+          <a:p>
+            <a:endParaRPr lang="en-US" altLang="ko-KR"/>
+          </a:p>
+          <a:p>
+            <a:r>
+              <a:rPr lang="en-US" altLang="ko-KR"/>
+              <a:t>contou</a:t>
+            </a:r>
+            <a:r>
+              <a:rPr lang="ko-KR" altLang="en-US"/>
+              <a:t>의 두께 </a:t>
+            </a:r>
+            <a:r>
+              <a:rPr lang="en-US" altLang="ko-KR"/>
+              <a:t>= -1 </a:t>
+            </a:r>
+            <a:r>
+              <a:rPr lang="ko-KR" altLang="en-US"/>
+              <a:t>로 하면 채워줌</a:t>
+            </a:r>
+            <a:endParaRPr lang="en-US" altLang="ko-KR"/>
+          </a:p>
+          <a:p>
+            <a:endParaRPr lang="en-US" altLang="ko-KR"/>
+          </a:p>
+          <a:p>
+            <a:endParaRPr lang="en-US" altLang="ko-KR"/>
+          </a:p>
+          <a:p>
+            <a:endParaRPr lang="en-US" altLang="ko-KR"/>
+          </a:p>
+        </p:txBody>
+      </p:sp>
+      <p:pic>
+        <p:nvPicPr>
+          <p:cNvPr id="4" name="그림 3">
+            <a:extLst>
+              <a:ext uri="{FF2B5EF4-FFF2-40B4-BE49-F238E27FC236}">
+                <a16:creationId xmlns:a16="http://schemas.microsoft.com/office/drawing/2014/main" id="{D8BF2873-E477-4C47-873D-1F8796584B0D}"/>
+              </a:ext>
+            </a:extLst>
+          </p:cNvPr>
+          <p:cNvPicPr>
+            <a:picLocks noChangeAspect="1"/>
+          </p:cNvPicPr>
+          <p:nvPr/>
+        </p:nvPicPr>
+        <p:blipFill>
+          <a:blip r:embed="rId2"/>
+          <a:stretch>
+            <a:fillRect/>
+          </a:stretch>
+        </p:blipFill>
+        <p:spPr>
+          <a:xfrm>
+            <a:off x="838200" y="2577748"/>
+            <a:ext cx="9481790" cy="1111936"/>
+          </a:xfrm>
+          <a:prstGeom prst="rect">
+            <a:avLst/>
+          </a:prstGeom>
+        </p:spPr>
+      </p:pic>
+    </p:spTree>
+    <p:extLst>
+      <p:ext uri="{BB962C8B-B14F-4D97-AF65-F5344CB8AC3E}">
+        <p14:creationId xmlns:p14="http://schemas.microsoft.com/office/powerpoint/2010/main" val="4135390198"/>
+      </p:ext>
+    </p:extLst>
+  </p:cSld>
+  <p:clrMapOvr>
+    <a:masterClrMapping/>
+  </p:clrMapOvr>
+</p:sld>
+</file>
+
+<file path=ppt/slides/slide17.xml><?xml version="1.0" encoding="utf-8"?>
+<p:sld xmlns:a="http://schemas.openxmlformats.org/drawingml/2006/main" xmlns:r="http://schemas.openxmlformats.org/officeDocument/2006/relationships" xmlns:p="http://schemas.openxmlformats.org/presentationml/2006/main">
+  <p:cSld>
+    <p:spTree>
+      <p:nvGrpSpPr>
+        <p:cNvPr id="1" name=""/>
+        <p:cNvGrpSpPr/>
+        <p:nvPr/>
+      </p:nvGrpSpPr>
+      <p:grpSpPr>
+        <a:xfrm>
+          <a:off x="0" y="0"/>
+          <a:ext cx="0" cy="0"/>
+          <a:chOff x="0" y="0"/>
+          <a:chExt cx="0" cy="0"/>
+        </a:xfrm>
+      </p:grpSpPr>
+      <p:sp>
+        <p:nvSpPr>
+          <p:cNvPr id="2" name="제목 1">
+            <a:extLst>
+              <a:ext uri="{FF2B5EF4-FFF2-40B4-BE49-F238E27FC236}">
+                <a16:creationId xmlns:a16="http://schemas.microsoft.com/office/drawing/2014/main" id="{3E96297C-4E91-4968-B641-07DF5348EE2C}"/>
+              </a:ext>
+            </a:extLst>
+          </p:cNvPr>
+          <p:cNvSpPr>
+            <a:spLocks noGrp="1"/>
+          </p:cNvSpPr>
+          <p:nvPr>
+            <p:ph type="title"/>
+          </p:nvPr>
+        </p:nvSpPr>
+        <p:spPr/>
+        <p:txBody>
+          <a:bodyPr/>
+          <a:lstStyle/>
+          <a:p>
+            <a:endParaRPr lang="ko-KR" altLang="en-US"/>
+          </a:p>
+        </p:txBody>
+      </p:sp>
+      <p:sp>
+        <p:nvSpPr>
+          <p:cNvPr id="3" name="내용 개체 틀 2">
+            <a:extLst>
+              <a:ext uri="{FF2B5EF4-FFF2-40B4-BE49-F238E27FC236}">
+                <a16:creationId xmlns:a16="http://schemas.microsoft.com/office/drawing/2014/main" id="{2D54CE7C-DC42-44A1-AEB1-201D966A9B2D}"/>
+              </a:ext>
+            </a:extLst>
+          </p:cNvPr>
+          <p:cNvSpPr>
+            <a:spLocks noGrp="1"/>
+          </p:cNvSpPr>
+          <p:nvPr>
+            <p:ph idx="1"/>
+          </p:nvPr>
+        </p:nvSpPr>
+        <p:spPr/>
+        <p:txBody>
+          <a:bodyPr/>
+          <a:lstStyle/>
+          <a:p>
+            <a:r>
+              <a:rPr lang="en-US" altLang="ko-KR"/>
+              <a:t>gradient(</a:t>
+            </a:r>
+            <a:r>
+              <a:rPr lang="ko-KR" altLang="en-US"/>
+              <a:t>이미지 경사도 혹은 수학적인 용어로 이미지의 변화율</a:t>
+            </a:r>
+            <a:r>
+              <a:rPr lang="en-US" altLang="ko-KR"/>
+              <a:t>)</a:t>
+            </a:r>
+            <a:endParaRPr lang="ko-KR" altLang="en-US"/>
+          </a:p>
+        </p:txBody>
+      </p:sp>
+    </p:spTree>
+    <p:extLst>
+      <p:ext uri="{BB962C8B-B14F-4D97-AF65-F5344CB8AC3E}">
+        <p14:creationId xmlns:p14="http://schemas.microsoft.com/office/powerpoint/2010/main" val="4026238565"/>
+      </p:ext>
+    </p:extLst>
+  </p:cSld>
+  <p:clrMapOvr>
+    <a:masterClrMapping/>
+  </p:clrMapOvr>
+</p:sld>
+</file>
+
 <file path=ppt/slides/slide2.xml><?xml version="1.0" encoding="utf-8"?>
 <p:sld xmlns:a="http://schemas.openxmlformats.org/drawingml/2006/main" xmlns:r="http://schemas.openxmlformats.org/officeDocument/2006/relationships" xmlns:p="http://schemas.openxmlformats.org/presentationml/2006/main">
   <p:cSld>

</xml_diff>